<commit_message>
added some text to a slide
</commit_message>
<xml_diff>
--- a/McKeegan-hw6.pptx
+++ b/McKeegan-hw6.pptx
@@ -4123,7 +4123,7 @@
         <p:spPr>
           <a:xfrm>
             <a:off x="899187" y="2108460"/>
-            <a:ext cx="2712720" cy="369332"/>
+            <a:ext cx="2712720" cy="3231654"/>
           </a:xfrm>
           <a:prstGeom prst="rect">
             <a:avLst/>
@@ -4139,6 +4139,24 @@
             <a:r>
               <a:rPr lang="en-US" dirty="0"/>
               <a:t>Still good papers!!!!!!!!!!!</a:t>
+            </a:r>
+          </a:p>
+          <a:p>
+            <a:endParaRPr lang="en-US" dirty="0"/>
+          </a:p>
+          <a:p>
+            <a:r>
+              <a:rPr lang="en-US" sz="1400" dirty="0"/>
+              <a:t>The first one was only because I was searching for figures by this author (he has a lot of cool data, hence selecting one of his figures for the previous slide), but found the numbers &amp; colors very hard to distinguish in this one.</a:t>
+            </a:r>
+          </a:p>
+          <a:p>
+            <a:endParaRPr lang="en-US" sz="1400" dirty="0"/>
+          </a:p>
+          <a:p>
+            <a:r>
+              <a:rPr lang="en-US" sz="1400" dirty="0"/>
+              <a:t>The second one is from a paper I cite often, but I just don’t really think it shows much or is visually appealing or very clear.</a:t>
             </a:r>
           </a:p>
         </p:txBody>

</xml_diff>